<commit_message>
data model created for the login with otp service
</commit_message>
<xml_diff>
--- a/ppt/Product 1 (1).pptx
+++ b/ppt/Product 1 (1).pptx
@@ -5,7 +5,7 @@
     <p:sldMasterId id="2147483648" r:id="rId1"/>
   </p:sldMasterIdLst>
   <p:notesMasterIdLst>
-    <p:notesMasterId r:id="rId26"/>
+    <p:notesMasterId r:id="rId27"/>
   </p:notesMasterIdLst>
   <p:sldIdLst>
     <p:sldId id="256" r:id="rId2"/>
@@ -30,30 +30,31 @@
     <p:sldId id="275" r:id="rId21"/>
     <p:sldId id="276" r:id="rId22"/>
     <p:sldId id="277" r:id="rId23"/>
-    <p:sldId id="278" r:id="rId24"/>
-    <p:sldId id="279" r:id="rId25"/>
+    <p:sldId id="280" r:id="rId24"/>
+    <p:sldId id="278" r:id="rId25"/>
+    <p:sldId id="279" r:id="rId26"/>
   </p:sldIdLst>
   <p:sldSz cx="9144000" cy="5143500" type="screen16x9"/>
   <p:notesSz cx="6858000" cy="9144000"/>
   <p:embeddedFontLst>
     <p:embeddedFont>
-      <p:font typeface="Roboto" panose="020B0604020202020204" charset="0"/>
-      <p:regular r:id="rId27"/>
-      <p:bold r:id="rId28"/>
+      <p:font typeface="Geo" panose="020B0604020202020204"/>
+      <p:regular r:id="rId28"/>
       <p:italic r:id="rId29"/>
-      <p:boldItalic r:id="rId30"/>
     </p:embeddedFont>
     <p:embeddedFont>
-      <p:font typeface="Geo" panose="020B0604020202020204"/>
-      <p:regular r:id="rId31"/>
+      <p:font typeface="Roboto" panose="020B0604020202020204" charset="0"/>
+      <p:regular r:id="rId30"/>
+      <p:bold r:id="rId31"/>
       <p:italic r:id="rId32"/>
+      <p:boldItalic r:id="rId33"/>
     </p:embeddedFont>
     <p:embeddedFont>
       <p:font typeface="Georgia" panose="02040502050405020303" pitchFamily="18" charset="0"/>
-      <p:regular r:id="rId33"/>
-      <p:bold r:id="rId34"/>
-      <p:italic r:id="rId35"/>
-      <p:boldItalic r:id="rId36"/>
+      <p:regular r:id="rId34"/>
+      <p:bold r:id="rId35"/>
+      <p:italic r:id="rId36"/>
+      <p:boldItalic r:id="rId37"/>
     </p:embeddedFont>
   </p:embeddedFontLst>
   <p:defaultTextStyle>
@@ -301,7 +302,7 @@
       </p15:sldGuideLst>
     </p:ext>
     <p:ext uri="http://customooxmlschemas.google.com/">
-      <go:slidesCustomData xmlns="" xmlns:mc="http://schemas.openxmlformats.org/markup-compatibility/2006" xmlns:mv="urn:schemas-microsoft-com:mac:vml" xmlns:c="http://schemas.openxmlformats.org/drawingml/2006/chart" xmlns:dgm="http://schemas.openxmlformats.org/drawingml/2006/diagram" xmlns:o="urn:schemas-microsoft-com:office:office" xmlns:v="urn:schemas-microsoft-com:vml" xmlns:pvml="urn:schemas-microsoft-com:office:powerpoint" xmlns:com="http://schemas.openxmlformats.org/drawingml/2006/compatibility" xmlns:p14="http://schemas.microsoft.com/office/powerpoint/2010/main" xmlns:p15="http://schemas.microsoft.com/office/powerpoint/2012/main" xmlns:ahyp="http://schemas.microsoft.com/office/drawing/2018/hyperlinkcolor" xmlns:go="http://customooxmlschemas.google.com/" r:id="rId37" roundtripDataSignature="AMtx7mgHrS622P/1g9/qrz2vxOtKfK5BPg=="/>
+      <go:slidesCustomData xmlns:go="http://customooxmlschemas.google.com/" xmlns:ahyp="http://schemas.microsoft.com/office/drawing/2018/hyperlinkcolor" xmlns:p15="http://schemas.microsoft.com/office/powerpoint/2012/main" xmlns:p14="http://schemas.microsoft.com/office/powerpoint/2010/main" xmlns:com="http://schemas.openxmlformats.org/drawingml/2006/compatibility" xmlns:pvml="urn:schemas-microsoft-com:office:powerpoint" xmlns:v="urn:schemas-microsoft-com:vml" xmlns:o="urn:schemas-microsoft-com:office:office" xmlns:dgm="http://schemas.openxmlformats.org/drawingml/2006/diagram" xmlns:c="http://schemas.openxmlformats.org/drawingml/2006/chart" xmlns:mv="urn:schemas-microsoft-com:mac:vml" xmlns:mc="http://schemas.openxmlformats.org/markup-compatibility/2006" xmlns="" r:id="rId38" roundtripDataSignature="AMtx7mgHrS622P/1g9/qrz2vxOtKfK5BPg=="/>
     </p:ext>
   </p:extLst>
 </p:presentation>
@@ -2671,6 +2672,115 @@
   <p:cSld>
     <p:spTree>
       <p:nvGrpSpPr>
+        <p:cNvPr id="1" name="Shape 194"/>
+        <p:cNvGrpSpPr/>
+        <p:nvPr/>
+      </p:nvGrpSpPr>
+      <p:grpSpPr>
+        <a:xfrm>
+          <a:off x="0" y="0"/>
+          <a:ext cx="0" cy="0"/>
+          <a:chOff x="0" y="0"/>
+          <a:chExt cx="0" cy="0"/>
+        </a:xfrm>
+      </p:grpSpPr>
+      <p:sp>
+        <p:nvSpPr>
+          <p:cNvPr id="195" name="Google Shape;195;g14043b2a0cc_1_6:notes"/>
+          <p:cNvSpPr>
+            <a:spLocks noGrp="1" noRot="1" noChangeAspect="1"/>
+          </p:cNvSpPr>
+          <p:nvPr>
+            <p:ph type="sldImg" idx="2"/>
+          </p:nvPr>
+        </p:nvSpPr>
+        <p:spPr>
+          <a:xfrm>
+            <a:off x="381000" y="685800"/>
+            <a:ext cx="6096000" cy="3429000"/>
+          </a:xfrm>
+          <a:custGeom>
+            <a:avLst/>
+            <a:gdLst/>
+            <a:ahLst/>
+            <a:cxnLst/>
+            <a:rect l="l" t="t" r="r" b="b"/>
+            <a:pathLst>
+              <a:path w="120000" h="120000" extrusionOk="0">
+                <a:moveTo>
+                  <a:pt x="0" y="0"/>
+                </a:moveTo>
+                <a:lnTo>
+                  <a:pt x="120000" y="0"/>
+                </a:lnTo>
+                <a:lnTo>
+                  <a:pt x="120000" y="120000"/>
+                </a:lnTo>
+                <a:lnTo>
+                  <a:pt x="0" y="120000"/>
+                </a:lnTo>
+                <a:close/>
+              </a:path>
+            </a:pathLst>
+          </a:custGeom>
+        </p:spPr>
+      </p:sp>
+      <p:sp>
+        <p:nvSpPr>
+          <p:cNvPr id="196" name="Google Shape;196;g14043b2a0cc_1_6:notes"/>
+          <p:cNvSpPr txBox="1">
+            <a:spLocks noGrp="1"/>
+          </p:cNvSpPr>
+          <p:nvPr>
+            <p:ph type="body" idx="1"/>
+          </p:nvPr>
+        </p:nvSpPr>
+        <p:spPr>
+          <a:xfrm>
+            <a:off x="685800" y="4343400"/>
+            <a:ext cx="5486400" cy="4114800"/>
+          </a:xfrm>
+          <a:prstGeom prst="rect">
+            <a:avLst/>
+          </a:prstGeom>
+        </p:spPr>
+        <p:txBody>
+          <a:bodyPr spcFirstLastPara="1" wrap="square" lIns="91425" tIns="91425" rIns="91425" bIns="91425" anchor="t" anchorCtr="0">
+            <a:noAutofit/>
+          </a:bodyPr>
+          <a:lstStyle/>
+          <a:p>
+            <a:pPr marL="0" lvl="0" indent="0" algn="l" rtl="0">
+              <a:spcBef>
+                <a:spcPts val="0"/>
+              </a:spcBef>
+              <a:spcAft>
+                <a:spcPts val="0"/>
+              </a:spcAft>
+              <a:buNone/>
+            </a:pPr>
+            <a:endParaRPr/>
+          </a:p>
+        </p:txBody>
+      </p:sp>
+    </p:spTree>
+    <p:extLst>
+      <p:ext uri="{BB962C8B-B14F-4D97-AF65-F5344CB8AC3E}">
+        <p14:creationId xmlns:p14="http://schemas.microsoft.com/office/powerpoint/2010/main" val="2906455282"/>
+      </p:ext>
+    </p:extLst>
+  </p:cSld>
+  <p:clrMapOvr>
+    <a:masterClrMapping/>
+  </p:clrMapOvr>
+</p:notes>
+</file>
+
+<file path=ppt/notesSlides/notesSlide24.xml><?xml version="1.0" encoding="utf-8"?>
+<p:notes xmlns:a="http://schemas.openxmlformats.org/drawingml/2006/main" xmlns:r="http://schemas.openxmlformats.org/officeDocument/2006/relationships" xmlns:p="http://schemas.openxmlformats.org/presentationml/2006/main" showMasterSp="0" showMasterPhAnim="0">
+  <p:cSld>
+    <p:spTree>
+      <p:nvGrpSpPr>
         <p:cNvPr id="1" name="Shape 200"/>
         <p:cNvGrpSpPr/>
         <p:nvPr/>
@@ -2788,7 +2898,7 @@
 </p:notes>
 </file>
 
-<file path=ppt/notesSlides/notesSlide24.xml><?xml version="1.0" encoding="utf-8"?>
+<file path=ppt/notesSlides/notesSlide25.xml><?xml version="1.0" encoding="utf-8"?>
 <p:notes xmlns:a="http://schemas.openxmlformats.org/drawingml/2006/main" xmlns:r="http://schemas.openxmlformats.org/officeDocument/2006/relationships" xmlns:p="http://schemas.openxmlformats.org/presentationml/2006/main" showMasterSp="0" showMasterPhAnim="0">
   <p:cSld>
     <p:spTree>
@@ -14181,7 +14291,7 @@
                 <a:hlinkClick r:id="rId5">
                   <a:extLst>
                     <a:ext uri="{A12FA001-AC4F-418D-AE19-62706E023703}">
-                      <ahyp:hlinkClr xmlns:ahyp="http://schemas.microsoft.com/office/drawing/2018/hyperlinkcolor" xmlns="" val="tx"/>
+                      <ahyp:hlinkClr xmlns="" xmlns:ahyp="http://schemas.microsoft.com/office/drawing/2018/hyperlinkcolor" val="tx"/>
                     </a:ext>
                   </a:extLst>
                 </a:hlinkClick>
@@ -14873,11 +14983,11 @@
   <p:clrMapOvr>
     <a:masterClrMapping/>
   </p:clrMapOvr>
-  <mc:AlternateContent xmlns:mc="http://schemas.openxmlformats.org/markup-compatibility/2006">
-    <mc:Choice xmlns:p14="http://schemas.microsoft.com/office/powerpoint/2010/main" Requires="p14">
+  <mc:AlternateContent xmlns:mc="http://schemas.openxmlformats.org/markup-compatibility/2006" xmlns:p14="http://schemas.microsoft.com/office/powerpoint/2010/main">
+    <mc:Choice Requires="p14">
       <p:transition spd="slow" p14:dur="2000"/>
     </mc:Choice>
-    <mc:Fallback>
+    <mc:Fallback xmlns="">
       <p:transition spd="slow"/>
     </mc:Fallback>
   </mc:AlternateContent>
@@ -15700,7 +15810,7 @@
           <p:nvPr>
             <p:extLst>
               <p:ext uri="{D42A27DB-BD31-4B8C-83A1-F6EECF244321}">
-                <p14:modId xmlns:p14="http://schemas.microsoft.com/office/powerpoint/2010/main" val="1376832036"/>
+                <p14:modId xmlns:p14="http://schemas.microsoft.com/office/powerpoint/2010/main" val="3537008221"/>
               </p:ext>
             </p:extLst>
           </p:nvPr>
@@ -15925,23 +16035,7 @@
                             <a:srgbClr val="FF0000"/>
                           </a:solidFill>
                         </a:rPr>
-                        <a:t>[</a:t>
-                      </a:r>
-                      <a:r>
-                        <a:rPr lang="en-US" dirty="0" err="1" smtClean="0">
-                          <a:solidFill>
-                            <a:srgbClr val="FF0000"/>
-                          </a:solidFill>
-                        </a:rPr>
-                        <a:t>Rituraj</a:t>
-                      </a:r>
-                      <a:r>
-                        <a:rPr lang="en-US" dirty="0" smtClean="0">
-                          <a:solidFill>
-                            <a:srgbClr val="FF0000"/>
-                          </a:solidFill>
-                        </a:rPr>
-                        <a:t>]</a:t>
+                        <a:t>[Abhay]</a:t>
                       </a:r>
                       <a:endParaRPr dirty="0">
                         <a:solidFill>
@@ -16048,15 +16142,7 @@
                             <a:srgbClr val="FF0000"/>
                           </a:solidFill>
                         </a:rPr>
-                        <a:t>[Prince][</a:t>
-                      </a:r>
-                      <a:r>
-                        <a:rPr lang="en-US" dirty="0" err="1" smtClean="0">
-                          <a:solidFill>
-                            <a:srgbClr val="FF0000"/>
-                          </a:solidFill>
-                        </a:rPr>
-                        <a:t>Mohit</a:t>
+                        <a:t>[Prince</a:t>
                       </a:r>
                       <a:r>
                         <a:rPr lang="en-US" dirty="0" smtClean="0">
@@ -16155,7 +16241,7 @@
                             <a:schemeClr val="dk1"/>
                           </a:solidFill>
                         </a:rPr>
-                        <a:t>Mysql</a:t>
+                        <a:t>Mysql </a:t>
                       </a:r>
                       <a:r>
                         <a:rPr lang="en-US" dirty="0" smtClean="0">
@@ -16163,7 +16249,23 @@
                             <a:srgbClr val="FF0000"/>
                           </a:solidFill>
                         </a:rPr>
-                        <a:t>[Abhay]</a:t>
+                        <a:t>[</a:t>
+                      </a:r>
+                      <a:r>
+                        <a:rPr lang="en-US" dirty="0" err="1" smtClean="0">
+                          <a:solidFill>
+                            <a:srgbClr val="FF0000"/>
+                          </a:solidFill>
+                        </a:rPr>
+                        <a:t>Rituraj</a:t>
+                      </a:r>
+                      <a:r>
+                        <a:rPr lang="en-US" dirty="0" smtClean="0">
+                          <a:solidFill>
+                            <a:srgbClr val="FF0000"/>
+                          </a:solidFill>
+                        </a:rPr>
+                        <a:t>]</a:t>
                       </a:r>
                       <a:endParaRPr lang="en-US" dirty="0">
                         <a:solidFill>
@@ -17498,14 +17600,14 @@
           <p:nvPr>
             <p:extLst>
               <p:ext uri="{D42A27DB-BD31-4B8C-83A1-F6EECF244321}">
-                <p14:modId xmlns:p14="http://schemas.microsoft.com/office/powerpoint/2010/main" val="2895404038"/>
+                <p14:modId xmlns:p14="http://schemas.microsoft.com/office/powerpoint/2010/main" val="457731907"/>
               </p:ext>
             </p:extLst>
           </p:nvPr>
         </p:nvGraphicFramePr>
         <p:xfrm>
           <a:off x="605925" y="499875"/>
-          <a:ext cx="8381075" cy="4361725"/>
+          <a:ext cx="8381075" cy="4810953"/>
         </p:xfrm>
         <a:graphic>
           <a:graphicData uri="http://schemas.openxmlformats.org/drawingml/2006/table">
@@ -17537,7 +17639,7 @@
                   </a:extLst>
                 </a:gridCol>
               </a:tblGrid>
-              <a:tr h="1722975">
+              <a:tr h="2205198">
                 <a:tc>
                   <a:txBody>
                     <a:bodyPr/>
@@ -17561,14 +17663,22 @@
                         <a:buNone/>
                       </a:pPr>
                       <a:r>
-                        <a:rPr lang="en" sz="1300" dirty="0">
+                        <a:rPr lang="en" sz="1100" dirty="0" smtClean="0">
                           <a:solidFill>
                             <a:schemeClr val="dk1"/>
                           </a:solidFill>
                         </a:rPr>
-                        <a:t>1-User Authentication Service:</a:t>
-                      </a:r>
-                      <a:endParaRPr sz="1300" dirty="0">
+                        <a:t>1-login-service</a:t>
+                      </a:r>
+                      <a:r>
+                        <a:rPr lang="en" sz="1100" dirty="0">
+                          <a:solidFill>
+                            <a:schemeClr val="dk1"/>
+                          </a:solidFill>
+                        </a:rPr>
+                        <a:t>:</a:t>
+                      </a:r>
+                      <a:endParaRPr sz="1100" dirty="0">
                         <a:solidFill>
                           <a:schemeClr val="dk1"/>
                         </a:solidFill>
@@ -17593,14 +17703,22 @@
                         <a:buNone/>
                       </a:pPr>
                       <a:r>
-                        <a:rPr lang="en" sz="1300" dirty="0">
+                        <a:rPr lang="en" sz="1100" dirty="0">
                           <a:solidFill>
                             <a:schemeClr val="dk1"/>
                           </a:solidFill>
                         </a:rPr>
-                        <a:t>Class UserLogin{</a:t>
-                      </a:r>
-                      <a:endParaRPr sz="1300" dirty="0">
+                        <a:t>Class </a:t>
+                      </a:r>
+                      <a:r>
+                        <a:rPr lang="en" sz="1100" dirty="0" smtClean="0">
+                          <a:solidFill>
+                            <a:schemeClr val="dk1"/>
+                          </a:solidFill>
+                        </a:rPr>
+                        <a:t>User{</a:t>
+                      </a:r>
+                      <a:endParaRPr sz="1100" dirty="0">
                         <a:solidFill>
                           <a:schemeClr val="dk1"/>
                         </a:solidFill>
@@ -17625,14 +17743,59 @@
                         <a:buNone/>
                       </a:pPr>
                       <a:r>
-                        <a:rPr lang="en" sz="1300" dirty="0">
+                        <a:rPr lang="en" sz="1100" dirty="0" smtClean="0">
                           <a:solidFill>
                             <a:schemeClr val="dk1"/>
                           </a:solidFill>
                         </a:rPr>
-                        <a:t>“Email” : String,</a:t>
-                      </a:r>
-                      <a:endParaRPr sz="1300" dirty="0">
+                        <a:t>“</a:t>
+                      </a:r>
+                      <a:r>
+                        <a:rPr lang="en-US" sz="1100" b="0" i="0" u="none" strike="noStrike" cap="none" dirty="0" err="1" smtClean="0">
+                          <a:solidFill>
+                            <a:srgbClr val="000000"/>
+                          </a:solidFill>
+                          <a:effectLst/>
+                          <a:latin typeface="Arial"/>
+                          <a:ea typeface="Arial"/>
+                          <a:cs typeface="Arial"/>
+                          <a:sym typeface="Arial"/>
+                        </a:rPr>
+                        <a:t>userEmail</a:t>
+                      </a:r>
+                      <a:r>
+                        <a:rPr lang="en" sz="1100" dirty="0" smtClean="0">
+                          <a:solidFill>
+                            <a:schemeClr val="dk1"/>
+                          </a:solidFill>
+                        </a:rPr>
+                        <a:t>” </a:t>
+                      </a:r>
+                      <a:r>
+                        <a:rPr lang="en" sz="1100" dirty="0">
+                          <a:solidFill>
+                            <a:schemeClr val="dk1"/>
+                          </a:solidFill>
+                        </a:rPr>
+                        <a:t>: </a:t>
+                      </a:r>
+                      <a:r>
+                        <a:rPr lang="en" sz="1100" dirty="0" smtClean="0">
+                          <a:solidFill>
+                            <a:schemeClr val="dk1"/>
+                          </a:solidFill>
+                        </a:rPr>
+                        <a:t>String</a:t>
+                      </a:r>
+                      <a:r>
+                        <a:rPr lang="en" sz="1100" dirty="0">
+                          <a:solidFill>
+                            <a:schemeClr val="dk1"/>
+                          </a:solidFill>
+                        </a:rPr>
+                        <a:t>,</a:t>
+                      </a:r>
+                      <a:endParaRPr sz="1100" dirty="0">
                         <a:solidFill>
                           <a:schemeClr val="dk1"/>
                         </a:solidFill>
@@ -17657,22 +17820,173 @@
                         <a:buNone/>
                       </a:pPr>
                       <a:r>
-                        <a:rPr lang="en" sz="1300" dirty="0">
+                        <a:rPr lang="en" sz="1100" dirty="0" smtClean="0">
                           <a:solidFill>
                             <a:schemeClr val="dk1"/>
                           </a:solidFill>
                         </a:rPr>
-                        <a:t>“Password” : </a:t>
-                      </a:r>
-                      <a:r>
-                        <a:rPr lang="en" sz="1300" dirty="0" smtClean="0">
+                        <a:t>“</a:t>
+                      </a:r>
+                      <a:r>
+                        <a:rPr lang="en-US" sz="1100" b="0" i="0" u="none" strike="noStrike" cap="none" dirty="0" err="1" smtClean="0">
+                          <a:solidFill>
+                            <a:srgbClr val="000000"/>
+                          </a:solidFill>
+                          <a:effectLst/>
+                          <a:latin typeface="Arial"/>
+                          <a:ea typeface="Arial"/>
+                          <a:cs typeface="Arial"/>
+                          <a:sym typeface="Arial"/>
+                        </a:rPr>
+                        <a:t>userFullName</a:t>
+                      </a:r>
+                      <a:r>
+                        <a:rPr lang="en" sz="1100" dirty="0" smtClean="0">
                           <a:solidFill>
                             <a:schemeClr val="dk1"/>
                           </a:solidFill>
                         </a:rPr>
-                        <a:t>String</a:t>
-                      </a:r>
-                      <a:endParaRPr sz="1300" dirty="0">
+                        <a:t>” </a:t>
+                      </a:r>
+                      <a:r>
+                        <a:rPr lang="en" sz="1100" dirty="0">
+                          <a:solidFill>
+                            <a:schemeClr val="dk1"/>
+                          </a:solidFill>
+                        </a:rPr>
+                        <a:t>: </a:t>
+                      </a:r>
+                      <a:r>
+                        <a:rPr lang="en" sz="1100" dirty="0" smtClean="0">
+                          <a:solidFill>
+                            <a:schemeClr val="dk1"/>
+                          </a:solidFill>
+                        </a:rPr>
+                        <a:t>String,</a:t>
+                      </a:r>
+                    </a:p>
+                    <a:p>
+                      <a:pPr marL="0" lvl="0" indent="0" algn="l" rtl="0">
+                        <a:lnSpc>
+                          <a:spcPct val="115000"/>
+                        </a:lnSpc>
+                        <a:spcBef>
+                          <a:spcPts val="0"/>
+                        </a:spcBef>
+                        <a:spcAft>
+                          <a:spcPts val="0"/>
+                        </a:spcAft>
+                        <a:buClr>
+                          <a:schemeClr val="dk1"/>
+                        </a:buClr>
+                        <a:buSzPts val="1100"/>
+                        <a:buFont typeface="Arial"/>
+                        <a:buNone/>
+                      </a:pPr>
+                      <a:r>
+                        <a:rPr lang="en" sz="1100" dirty="0" smtClean="0">
+                          <a:solidFill>
+                            <a:schemeClr val="dk1"/>
+                          </a:solidFill>
+                        </a:rPr>
+                        <a:t>“</a:t>
+                      </a:r>
+                      <a:r>
+                        <a:rPr lang="en-US" sz="1100" b="0" i="0" u="none" strike="noStrike" cap="none" dirty="0" err="1" smtClean="0">
+                          <a:solidFill>
+                            <a:srgbClr val="000000"/>
+                          </a:solidFill>
+                          <a:effectLst/>
+                          <a:latin typeface="Arial"/>
+                          <a:ea typeface="Arial"/>
+                          <a:cs typeface="Arial"/>
+                          <a:sym typeface="Arial"/>
+                        </a:rPr>
+                        <a:t>userPassword</a:t>
+                      </a:r>
+                      <a:r>
+                        <a:rPr lang="en" sz="1100" dirty="0" smtClean="0">
+                          <a:solidFill>
+                            <a:schemeClr val="dk1"/>
+                          </a:solidFill>
+                        </a:rPr>
+                        <a:t>”:</a:t>
+                      </a:r>
+                      <a:r>
+                        <a:rPr lang="en" sz="1100" baseline="0" dirty="0" smtClean="0">
+                          <a:solidFill>
+                            <a:schemeClr val="dk1"/>
+                          </a:solidFill>
+                        </a:rPr>
+                        <a:t> String,</a:t>
+                      </a:r>
+                    </a:p>
+                    <a:p>
+                      <a:pPr marL="0" lvl="0" indent="0" algn="l" rtl="0">
+                        <a:lnSpc>
+                          <a:spcPct val="115000"/>
+                        </a:lnSpc>
+                        <a:spcBef>
+                          <a:spcPts val="0"/>
+                        </a:spcBef>
+                        <a:spcAft>
+                          <a:spcPts val="0"/>
+                        </a:spcAft>
+                        <a:buClr>
+                          <a:schemeClr val="dk1"/>
+                        </a:buClr>
+                        <a:buSzPts val="1100"/>
+                        <a:buFont typeface="Arial"/>
+                        <a:buNone/>
+                      </a:pPr>
+                      <a:r>
+                        <a:rPr lang="en" sz="1100" baseline="0" dirty="0" smtClean="0">
+                          <a:solidFill>
+                            <a:schemeClr val="dk1"/>
+                          </a:solidFill>
+                        </a:rPr>
+                        <a:t>“</a:t>
+                      </a:r>
+                      <a:r>
+                        <a:rPr lang="en-US" sz="1100" b="0" i="0" u="none" strike="noStrike" cap="none" dirty="0" smtClean="0">
+                          <a:solidFill>
+                            <a:srgbClr val="000000"/>
+                          </a:solidFill>
+                          <a:effectLst/>
+                          <a:latin typeface="Arial"/>
+                          <a:ea typeface="Arial"/>
+                          <a:cs typeface="Arial"/>
+                          <a:sym typeface="Arial"/>
+                        </a:rPr>
+                        <a:t>role” : </a:t>
+                      </a:r>
+                      <a:r>
+                        <a:rPr lang="en-US" sz="1100" dirty="0" smtClean="0">
+                          <a:solidFill>
+                            <a:srgbClr val="000000"/>
+                          </a:solidFill>
+                          <a:effectLst/>
+                        </a:rPr>
+                        <a:t>Set</a:t>
+                      </a:r>
+                      <a:r>
+                        <a:rPr lang="en-US" sz="1100" dirty="0" smtClean="0"/>
+                        <a:t>&lt;</a:t>
+                      </a:r>
+                      <a:r>
+                        <a:rPr lang="en-US" sz="1100" dirty="0" smtClean="0">
+                          <a:solidFill>
+                            <a:srgbClr val="000000"/>
+                          </a:solidFill>
+                          <a:effectLst/>
+                        </a:rPr>
+                        <a:t>Role</a:t>
+                      </a:r>
+                      <a:r>
+                        <a:rPr lang="en-US" sz="1100" dirty="0" smtClean="0"/>
+                        <a:t>&gt;</a:t>
+                      </a:r>
+                      <a:endParaRPr lang="en-US" sz="1100" dirty="0" smtClean="0">
                         <a:solidFill>
                           <a:schemeClr val="dk1"/>
                         </a:solidFill>
@@ -17697,14 +18011,188 @@
                         <a:buNone/>
                       </a:pPr>
                       <a:r>
-                        <a:rPr lang="en" sz="1300" dirty="0">
+                        <a:rPr lang="en" sz="1100" dirty="0" smtClean="0">
                           <a:solidFill>
                             <a:schemeClr val="dk1"/>
                           </a:solidFill>
                         </a:rPr>
                         <a:t>}</a:t>
                       </a:r>
-                      <a:endParaRPr dirty="0"/>
+                    </a:p>
+                    <a:p>
+                      <a:pPr marL="0" lvl="0" indent="0" algn="l" rtl="0">
+                        <a:lnSpc>
+                          <a:spcPct val="115000"/>
+                        </a:lnSpc>
+                        <a:spcBef>
+                          <a:spcPts val="0"/>
+                        </a:spcBef>
+                        <a:spcAft>
+                          <a:spcPts val="0"/>
+                        </a:spcAft>
+                        <a:buClr>
+                          <a:schemeClr val="dk1"/>
+                        </a:buClr>
+                        <a:buSzPts val="1100"/>
+                        <a:buFont typeface="Arial"/>
+                        <a:buNone/>
+                      </a:pPr>
+                      <a:endParaRPr lang="en" sz="1100" dirty="0" smtClean="0">
+                        <a:solidFill>
+                          <a:schemeClr val="dk1"/>
+                        </a:solidFill>
+                      </a:endParaRPr>
+                    </a:p>
+                    <a:p>
+                      <a:pPr marL="0" lvl="0" indent="0" algn="l" rtl="0">
+                        <a:lnSpc>
+                          <a:spcPct val="115000"/>
+                        </a:lnSpc>
+                        <a:spcBef>
+                          <a:spcPts val="0"/>
+                        </a:spcBef>
+                        <a:spcAft>
+                          <a:spcPts val="0"/>
+                        </a:spcAft>
+                        <a:buClr>
+                          <a:schemeClr val="dk1"/>
+                        </a:buClr>
+                        <a:buSzPts val="1100"/>
+                        <a:buFont typeface="Arial"/>
+                        <a:buNone/>
+                      </a:pPr>
+                      <a:r>
+                        <a:rPr lang="en" sz="1100" dirty="0" smtClean="0">
+                          <a:solidFill>
+                            <a:schemeClr val="dk1"/>
+                          </a:solidFill>
+                        </a:rPr>
+                        <a:t>Class Role {</a:t>
+                      </a:r>
+                    </a:p>
+                    <a:p>
+                      <a:pPr marL="0" lvl="0" indent="0" algn="l" rtl="0">
+                        <a:lnSpc>
+                          <a:spcPct val="115000"/>
+                        </a:lnSpc>
+                        <a:spcBef>
+                          <a:spcPts val="0"/>
+                        </a:spcBef>
+                        <a:spcAft>
+                          <a:spcPts val="0"/>
+                        </a:spcAft>
+                        <a:buClr>
+                          <a:schemeClr val="dk1"/>
+                        </a:buClr>
+                        <a:buSzPts val="1100"/>
+                        <a:buFont typeface="Arial"/>
+                        <a:buNone/>
+                      </a:pPr>
+                      <a:r>
+                        <a:rPr lang="en" sz="1100" dirty="0" smtClean="0">
+                          <a:solidFill>
+                            <a:schemeClr val="dk1"/>
+                          </a:solidFill>
+                        </a:rPr>
+                        <a:t>“</a:t>
+                      </a:r>
+                      <a:r>
+                        <a:rPr lang="en-US" sz="1100" b="0" i="0" u="none" strike="noStrike" cap="none" dirty="0" err="1" smtClean="0">
+                          <a:solidFill>
+                            <a:srgbClr val="000000"/>
+                          </a:solidFill>
+                          <a:effectLst/>
+                          <a:latin typeface="Arial"/>
+                          <a:ea typeface="Arial"/>
+                          <a:cs typeface="Arial"/>
+                          <a:sym typeface="Arial"/>
+                        </a:rPr>
+                        <a:t>roleName</a:t>
+                      </a:r>
+                      <a:r>
+                        <a:rPr lang="en" sz="1100" dirty="0" smtClean="0">
+                          <a:solidFill>
+                            <a:schemeClr val="dk1"/>
+                          </a:solidFill>
+                        </a:rPr>
+                        <a:t>”: String,</a:t>
+                      </a:r>
+                    </a:p>
+                    <a:p>
+                      <a:pPr marL="0" lvl="0" indent="0" algn="l" rtl="0">
+                        <a:lnSpc>
+                          <a:spcPct val="115000"/>
+                        </a:lnSpc>
+                        <a:spcBef>
+                          <a:spcPts val="0"/>
+                        </a:spcBef>
+                        <a:spcAft>
+                          <a:spcPts val="0"/>
+                        </a:spcAft>
+                        <a:buClr>
+                          <a:schemeClr val="dk1"/>
+                        </a:buClr>
+                        <a:buSzPts val="1100"/>
+                        <a:buFont typeface="Arial"/>
+                        <a:buNone/>
+                      </a:pPr>
+                      <a:r>
+                        <a:rPr lang="en" sz="1100" dirty="0" smtClean="0">
+                          <a:solidFill>
+                            <a:schemeClr val="dk1"/>
+                          </a:solidFill>
+                        </a:rPr>
+                        <a:t>“</a:t>
+                      </a:r>
+                      <a:r>
+                        <a:rPr lang="en-US" sz="1100" b="0" i="0" u="none" strike="noStrike" cap="none" dirty="0" err="1" smtClean="0">
+                          <a:solidFill>
+                            <a:srgbClr val="000000"/>
+                          </a:solidFill>
+                          <a:effectLst/>
+                          <a:latin typeface="Arial"/>
+                          <a:ea typeface="Arial"/>
+                          <a:cs typeface="Arial"/>
+                          <a:sym typeface="Arial"/>
+                        </a:rPr>
+                        <a:t>roleDescription</a:t>
+                      </a:r>
+                      <a:r>
+                        <a:rPr lang="en" sz="1100" dirty="0" smtClean="0">
+                          <a:solidFill>
+                            <a:schemeClr val="dk1"/>
+                          </a:solidFill>
+                        </a:rPr>
+                        <a:t>”: String</a:t>
+                      </a:r>
+                    </a:p>
+                    <a:p>
+                      <a:pPr marL="0" lvl="0" indent="0" algn="l" rtl="0">
+                        <a:lnSpc>
+                          <a:spcPct val="115000"/>
+                        </a:lnSpc>
+                        <a:spcBef>
+                          <a:spcPts val="0"/>
+                        </a:spcBef>
+                        <a:spcAft>
+                          <a:spcPts val="0"/>
+                        </a:spcAft>
+                        <a:buClr>
+                          <a:schemeClr val="dk1"/>
+                        </a:buClr>
+                        <a:buSzPts val="1100"/>
+                        <a:buFont typeface="Arial"/>
+                        <a:buNone/>
+                      </a:pPr>
+                      <a:r>
+                        <a:rPr lang="en" sz="1100" dirty="0" smtClean="0">
+                          <a:solidFill>
+                            <a:schemeClr val="dk1"/>
+                          </a:solidFill>
+                        </a:rPr>
+                        <a:t>}</a:t>
+                      </a:r>
+                      <a:endParaRPr sz="1100" dirty="0"/>
                     </a:p>
                   </a:txBody>
                   <a:tcPr marL="91425" marR="91425" marT="91425" marB="91425"/>
@@ -18644,7 +19132,7 @@
                   </a:ext>
                 </a:extLst>
               </a:tr>
-              <a:tr h="2638750">
+              <a:tr h="2331054">
                 <a:tc>
                   <a:txBody>
                     <a:bodyPr/>
@@ -18668,14 +19156,14 @@
                         <a:buNone/>
                       </a:pPr>
                       <a:r>
-                        <a:rPr lang="en" sz="1200" dirty="0">
+                        <a:rPr lang="en" sz="1100" dirty="0" smtClean="0">
                           <a:solidFill>
                             <a:schemeClr val="dk1"/>
                           </a:solidFill>
                         </a:rPr>
-                        <a:t>3-Chat feature:-</a:t>
-                      </a:r>
-                      <a:endParaRPr sz="1200" dirty="0">
+                        <a:t>2-email-service:-</a:t>
+                      </a:r>
+                      <a:endParaRPr sz="1100" dirty="0" smtClean="0">
                         <a:solidFill>
                           <a:schemeClr val="dk1"/>
                         </a:solidFill>
@@ -18700,14 +19188,31 @@
                         <a:buNone/>
                       </a:pPr>
                       <a:r>
-                        <a:rPr lang="en" sz="1200" dirty="0">
+                        <a:rPr lang="en" sz="1100" dirty="0" smtClean="0">
                           <a:solidFill>
                             <a:schemeClr val="dk1"/>
                           </a:solidFill>
                         </a:rPr>
-                        <a:t>Class Chat{</a:t>
-                      </a:r>
-                      <a:endParaRPr sz="1200" dirty="0">
+                        <a:t>Class </a:t>
+                      </a:r>
+                      <a:r>
+                        <a:rPr lang="en-US" sz="1100" dirty="0" smtClean="0">
+                          <a:solidFill>
+                            <a:srgbClr val="000000"/>
+                          </a:solidFill>
+                          <a:effectLst/>
+                        </a:rPr>
+                        <a:t>EmailRequest</a:t>
+                      </a:r>
+                      <a:r>
+                        <a:rPr lang="en" sz="1100" dirty="0" smtClean="0">
+                          <a:solidFill>
+                            <a:schemeClr val="dk1"/>
+                          </a:solidFill>
+                        </a:rPr>
+                        <a:t>{</a:t>
+                      </a:r>
+                      <a:endParaRPr sz="1100" dirty="0" smtClean="0">
                         <a:solidFill>
                           <a:schemeClr val="dk1"/>
                         </a:solidFill>
@@ -18732,14 +19237,35 @@
                         <a:buNone/>
                       </a:pPr>
                       <a:r>
-                        <a:rPr lang="en" sz="1200" dirty="0">
+                        <a:rPr lang="en" sz="1100" dirty="0" smtClean="0">
                           <a:solidFill>
                             <a:schemeClr val="dk1"/>
                           </a:solidFill>
                         </a:rPr>
-                        <a:t>chatId:int,</a:t>
-                      </a:r>
-                      <a:endParaRPr sz="1200" dirty="0">
+                        <a:t>“</a:t>
+                      </a:r>
+                      <a:r>
+                        <a:rPr lang="en-US" sz="1100" b="0" i="0" u="none" strike="noStrike" cap="none" dirty="0" smtClean="0">
+                          <a:solidFill>
+                            <a:srgbClr val="000000"/>
+                          </a:solidFill>
+                          <a:effectLst/>
+                          <a:latin typeface="Arial"/>
+                          <a:ea typeface="Arial"/>
+                          <a:cs typeface="Arial"/>
+                          <a:sym typeface="Arial"/>
+                        </a:rPr>
+                        <a:t>subject</a:t>
+                      </a:r>
+                      <a:r>
+                        <a:rPr lang="en" sz="1100" dirty="0" smtClean="0">
+                          <a:solidFill>
+                            <a:schemeClr val="dk1"/>
+                          </a:solidFill>
+                        </a:rPr>
+                        <a:t>”:String,</a:t>
+                      </a:r>
+                      <a:endParaRPr sz="1100" dirty="0" smtClean="0">
                         <a:solidFill>
                           <a:schemeClr val="dk1"/>
                         </a:solidFill>
@@ -18764,14 +19290,35 @@
                         <a:buNone/>
                       </a:pPr>
                       <a:r>
-                        <a:rPr lang="en" sz="1200" dirty="0">
+                        <a:rPr lang="en" sz="1100" dirty="0" smtClean="0">
                           <a:solidFill>
                             <a:schemeClr val="dk1"/>
                           </a:solidFill>
                         </a:rPr>
-                        <a:t>“ownerEmail”: String,</a:t>
-                      </a:r>
-                      <a:endParaRPr sz="1200" dirty="0">
+                        <a:t>“</a:t>
+                      </a:r>
+                      <a:r>
+                        <a:rPr lang="en-US" sz="1100" b="0" i="0" u="none" strike="noStrike" cap="none" dirty="0" smtClean="0">
+                          <a:solidFill>
+                            <a:srgbClr val="000000"/>
+                          </a:solidFill>
+                          <a:effectLst/>
+                          <a:latin typeface="Arial"/>
+                          <a:ea typeface="Arial"/>
+                          <a:cs typeface="Arial"/>
+                          <a:sym typeface="Arial"/>
+                        </a:rPr>
+                        <a:t>message</a:t>
+                      </a:r>
+                      <a:r>
+                        <a:rPr lang="en" sz="1100" dirty="0" smtClean="0">
+                          <a:solidFill>
+                            <a:schemeClr val="dk1"/>
+                          </a:solidFill>
+                        </a:rPr>
+                        <a:t>”: String,</a:t>
+                      </a:r>
+                      <a:endParaRPr sz="1100" dirty="0" smtClean="0">
                         <a:solidFill>
                           <a:schemeClr val="dk1"/>
                         </a:solidFill>
@@ -18796,14 +19343,35 @@
                         <a:buNone/>
                       </a:pPr>
                       <a:r>
-                        <a:rPr lang="en" sz="1200" dirty="0">
+                        <a:rPr lang="en" sz="1100" dirty="0" smtClean="0">
                           <a:solidFill>
                             <a:schemeClr val="dk1"/>
                           </a:solidFill>
                         </a:rPr>
-                        <a:t>“buyerEmail”:String,</a:t>
-                      </a:r>
-                      <a:endParaRPr sz="1200" dirty="0">
+                        <a:t>“</a:t>
+                      </a:r>
+                      <a:r>
+                        <a:rPr lang="en-US" sz="1100" b="0" i="0" u="none" strike="noStrike" cap="none" dirty="0" smtClean="0">
+                          <a:solidFill>
+                            <a:srgbClr val="000000"/>
+                          </a:solidFill>
+                          <a:effectLst/>
+                          <a:latin typeface="Arial"/>
+                          <a:ea typeface="Arial"/>
+                          <a:cs typeface="Arial"/>
+                          <a:sym typeface="Arial"/>
+                        </a:rPr>
+                        <a:t>to</a:t>
+                      </a:r>
+                      <a:r>
+                        <a:rPr lang="en" sz="1100" dirty="0" smtClean="0">
+                          <a:solidFill>
+                            <a:schemeClr val="dk1"/>
+                          </a:solidFill>
+                        </a:rPr>
+                        <a:t>”:String,</a:t>
+                      </a:r>
+                      <a:endParaRPr sz="1100" dirty="0" smtClean="0">
                         <a:solidFill>
                           <a:schemeClr val="dk1"/>
                         </a:solidFill>
@@ -18828,17 +19396,179 @@
                         <a:buNone/>
                       </a:pPr>
                       <a:r>
-                        <a:rPr lang="en" sz="1200" dirty="0">
+                        <a:rPr lang="en" sz="1100" dirty="0" smtClean="0">
                           <a:solidFill>
                             <a:schemeClr val="dk1"/>
                           </a:solidFill>
                         </a:rPr>
-                        <a:t>“List&lt;Message&gt;”{</a:t>
-                      </a:r>
-                      <a:endParaRPr sz="1200" dirty="0">
+                        <a:t>}</a:t>
+                      </a:r>
+                    </a:p>
+                    <a:p>
+                      <a:pPr marL="0" lvl="0" indent="0" algn="l" rtl="0">
+                        <a:lnSpc>
+                          <a:spcPct val="115000"/>
+                        </a:lnSpc>
+                        <a:spcBef>
+                          <a:spcPts val="0"/>
+                        </a:spcBef>
+                        <a:spcAft>
+                          <a:spcPts val="0"/>
+                        </a:spcAft>
+                        <a:buClr>
+                          <a:schemeClr val="dk1"/>
+                        </a:buClr>
+                        <a:buSzPts val="1100"/>
+                        <a:buFont typeface="Arial"/>
+                        <a:buNone/>
+                      </a:pPr>
+                      <a:r>
+                        <a:rPr lang="en" sz="1100" dirty="0" smtClean="0">
+                          <a:solidFill>
+                            <a:schemeClr val="dk1"/>
+                          </a:solidFill>
+                        </a:rPr>
+                        <a:t>Class</a:t>
+                      </a:r>
+                      <a:r>
+                        <a:rPr lang="en" sz="1100" baseline="0" dirty="0" smtClean="0">
+                          <a:solidFill>
+                            <a:schemeClr val="dk1"/>
+                          </a:solidFill>
+                        </a:rPr>
+                        <a:t> </a:t>
+                      </a:r>
+                      <a:r>
+                        <a:rPr lang="en-US" sz="1100" dirty="0" smtClean="0">
+                          <a:solidFill>
+                            <a:srgbClr val="000000"/>
+                          </a:solidFill>
+                          <a:effectLst/>
+                        </a:rPr>
+                        <a:t>Verify {</a:t>
+                      </a:r>
+                    </a:p>
+                    <a:p>
+                      <a:pPr marL="0" lvl="0" indent="0" algn="l" rtl="0">
+                        <a:lnSpc>
+                          <a:spcPct val="115000"/>
+                        </a:lnSpc>
+                        <a:spcBef>
+                          <a:spcPts val="0"/>
+                        </a:spcBef>
+                        <a:spcAft>
+                          <a:spcPts val="0"/>
+                        </a:spcAft>
+                        <a:buClr>
+                          <a:schemeClr val="dk1"/>
+                        </a:buClr>
+                        <a:buSzPts val="1100"/>
+                        <a:buFont typeface="Arial"/>
+                        <a:buNone/>
+                      </a:pPr>
+                      <a:r>
+                        <a:rPr lang="en-US" sz="1100" dirty="0" smtClean="0">
+                          <a:solidFill>
+                            <a:srgbClr val="000000"/>
+                          </a:solidFill>
+                          <a:effectLst/>
+                        </a:rPr>
+                        <a:t>“</a:t>
+                      </a:r>
+                      <a:r>
+                        <a:rPr lang="en-US" sz="1100" b="0" i="0" u="none" strike="noStrike" cap="none" dirty="0" err="1" smtClean="0">
+                          <a:solidFill>
+                            <a:srgbClr val="000000"/>
+                          </a:solidFill>
+                          <a:effectLst/>
+                          <a:latin typeface="Arial"/>
+                          <a:ea typeface="Arial"/>
+                          <a:cs typeface="Arial"/>
+                          <a:sym typeface="Arial"/>
+                        </a:rPr>
+                        <a:t>senderEmail</a:t>
+                      </a:r>
+                      <a:r>
+                        <a:rPr lang="en-US" sz="1100" dirty="0" smtClean="0">
+                          <a:solidFill>
+                            <a:srgbClr val="000000"/>
+                          </a:solidFill>
+                          <a:effectLst/>
+                        </a:rPr>
+                        <a:t>”:String,</a:t>
+                      </a:r>
+                    </a:p>
+                    <a:p>
+                      <a:pPr marL="0" lvl="0" indent="0" algn="l" rtl="0">
+                        <a:lnSpc>
+                          <a:spcPct val="115000"/>
+                        </a:lnSpc>
+                        <a:spcBef>
+                          <a:spcPts val="0"/>
+                        </a:spcBef>
+                        <a:spcAft>
+                          <a:spcPts val="0"/>
+                        </a:spcAft>
+                        <a:buClr>
+                          <a:schemeClr val="dk1"/>
+                        </a:buClr>
+                        <a:buSzPts val="1100"/>
+                        <a:buFont typeface="Arial"/>
+                        <a:buNone/>
+                      </a:pPr>
+                      <a:r>
+                        <a:rPr lang="en-US" sz="1100" dirty="0" smtClean="0">
+                          <a:solidFill>
+                            <a:srgbClr val="000000"/>
+                          </a:solidFill>
+                          <a:effectLst/>
+                        </a:rPr>
+                        <a:t>“</a:t>
+                      </a:r>
+                      <a:r>
+                        <a:rPr lang="en-US" sz="1100" b="0" i="0" u="none" strike="noStrike" cap="none" dirty="0" err="1" smtClean="0">
+                          <a:solidFill>
+                            <a:srgbClr val="000000"/>
+                          </a:solidFill>
+                          <a:effectLst/>
+                          <a:latin typeface="Arial"/>
+                          <a:ea typeface="Arial"/>
+                          <a:cs typeface="Arial"/>
+                          <a:sym typeface="Arial"/>
+                        </a:rPr>
+                        <a:t>sendedOtp</a:t>
+                      </a:r>
+                      <a:r>
+                        <a:rPr lang="en-US" sz="1100" b="0" i="0" u="none" strike="noStrike" cap="none" dirty="0" smtClean="0">
+                          <a:solidFill>
+                            <a:srgbClr val="000000"/>
+                          </a:solidFill>
+                          <a:effectLst/>
+                          <a:latin typeface="Arial"/>
+                          <a:ea typeface="Arial"/>
+                          <a:cs typeface="Arial"/>
+                          <a:sym typeface="Arial"/>
+                        </a:rPr>
+                        <a:t>”:</a:t>
+                      </a:r>
+                      <a:r>
+                        <a:rPr lang="en-US" sz="1100" b="0" i="0" u="none" strike="noStrike" cap="none" dirty="0" err="1" smtClean="0">
+                          <a:solidFill>
+                            <a:srgbClr val="000000"/>
+                          </a:solidFill>
+                          <a:effectLst/>
+                          <a:latin typeface="Arial"/>
+                          <a:ea typeface="Arial"/>
+                          <a:cs typeface="Arial"/>
+                          <a:sym typeface="Arial"/>
+                        </a:rPr>
+                        <a:t>int</a:t>
+                      </a:r>
+                      <a:endParaRPr lang="en-US" sz="1100" dirty="0" smtClean="0">
                         <a:solidFill>
-                          <a:schemeClr val="dk1"/>
+                          <a:srgbClr val="000000"/>
                         </a:solidFill>
+                        <a:effectLst/>
                       </a:endParaRPr>
                     </a:p>
                     <a:p>
@@ -18860,110 +19590,15 @@
                         <a:buNone/>
                       </a:pPr>
                       <a:r>
-                        <a:rPr lang="en" sz="1200" dirty="0">
+                        <a:rPr lang="en-US" sz="1100" dirty="0" smtClean="0">
                           <a:solidFill>
-                            <a:schemeClr val="dk1"/>
+                            <a:srgbClr val="000000"/>
                           </a:solidFill>
-                        </a:rPr>
-                        <a:t>“senderEmail”:string,</a:t>
-                      </a:r>
-                      <a:endParaRPr sz="1200" dirty="0">
-                        <a:solidFill>
-                          <a:schemeClr val="dk1"/>
-                        </a:solidFill>
-                      </a:endParaRPr>
-                    </a:p>
-                    <a:p>
-                      <a:pPr marL="0" lvl="0" indent="0" algn="l" rtl="0">
-                        <a:lnSpc>
-                          <a:spcPct val="115000"/>
-                        </a:lnSpc>
-                        <a:spcBef>
-                          <a:spcPts val="0"/>
-                        </a:spcBef>
-                        <a:spcAft>
-                          <a:spcPts val="0"/>
-                        </a:spcAft>
-                        <a:buClr>
-                          <a:schemeClr val="dk1"/>
-                        </a:buClr>
-                        <a:buSzPts val="1100"/>
-                        <a:buFont typeface="Arial"/>
-                        <a:buNone/>
-                      </a:pPr>
-                      <a:r>
-                        <a:rPr lang="en" sz="1200" dirty="0">
-                          <a:solidFill>
-                            <a:schemeClr val="dk1"/>
-                          </a:solidFill>
-                        </a:rPr>
-                        <a:t>“Time”:time,</a:t>
-                      </a:r>
-                      <a:endParaRPr sz="1200" dirty="0">
-                        <a:solidFill>
-                          <a:schemeClr val="dk1"/>
-                        </a:solidFill>
-                      </a:endParaRPr>
-                    </a:p>
-                    <a:p>
-                      <a:pPr marL="0" lvl="0" indent="0" algn="l" rtl="0">
-                        <a:lnSpc>
-                          <a:spcPct val="115000"/>
-                        </a:lnSpc>
-                        <a:spcBef>
-                          <a:spcPts val="0"/>
-                        </a:spcBef>
-                        <a:spcAft>
-                          <a:spcPts val="0"/>
-                        </a:spcAft>
-                        <a:buClr>
-                          <a:schemeClr val="dk1"/>
-                        </a:buClr>
-                        <a:buSzPts val="1100"/>
-                        <a:buFont typeface="Arial"/>
-                        <a:buNone/>
-                      </a:pPr>
-                      <a:r>
-                        <a:rPr lang="en" sz="1200" dirty="0">
-                          <a:solidFill>
-                            <a:schemeClr val="dk1"/>
-                          </a:solidFill>
-                        </a:rPr>
-                        <a:t>“replyMessage”:string</a:t>
-                      </a:r>
-                      <a:endParaRPr sz="1200" dirty="0">
-                        <a:solidFill>
-                          <a:schemeClr val="dk1"/>
-                        </a:solidFill>
-                      </a:endParaRPr>
-                    </a:p>
-                    <a:p>
-                      <a:pPr marL="0" lvl="0" indent="0" algn="l" rtl="0">
-                        <a:lnSpc>
-                          <a:spcPct val="115000"/>
-                        </a:lnSpc>
-                        <a:spcBef>
-                          <a:spcPts val="0"/>
-                        </a:spcBef>
-                        <a:spcAft>
-                          <a:spcPts val="0"/>
-                        </a:spcAft>
-                        <a:buClr>
-                          <a:schemeClr val="dk1"/>
-                        </a:buClr>
-                        <a:buSzPts val="1100"/>
-                        <a:buFont typeface="Arial"/>
-                        <a:buNone/>
-                      </a:pPr>
-                      <a:r>
-                        <a:rPr lang="en" sz="1200" dirty="0">
-                          <a:solidFill>
-                            <a:schemeClr val="dk1"/>
-                          </a:solidFill>
+                          <a:effectLst/>
                         </a:rPr>
                         <a:t>}</a:t>
                       </a:r>
-                      <a:endParaRPr sz="1200" dirty="0">
+                      <a:endParaRPr sz="1100" dirty="0">
                         <a:solidFill>
                           <a:schemeClr val="dk1"/>
                         </a:solidFill>
@@ -19180,7 +19815,7 @@
         </p:nvGraphicFramePr>
         <p:xfrm>
           <a:off x="745450" y="1068325"/>
-          <a:ext cx="3000000" cy="3000000"/>
+          <a:ext cx="7669425" cy="3550900"/>
         </p:xfrm>
         <a:graphic>
           <a:graphicData uri="http://schemas.openxmlformats.org/drawingml/2006/table">
@@ -20183,6 +20818,1182 @@
   <p:cSld>
     <p:spTree>
       <p:nvGrpSpPr>
+        <p:cNvPr id="1" name="Shape 197"/>
+        <p:cNvGrpSpPr/>
+        <p:nvPr/>
+      </p:nvGrpSpPr>
+      <p:grpSpPr>
+        <a:xfrm>
+          <a:off x="0" y="0"/>
+          <a:ext cx="0" cy="0"/>
+          <a:chOff x="0" y="0"/>
+          <a:chExt cx="0" cy="0"/>
+        </a:xfrm>
+      </p:grpSpPr>
+      <p:sp>
+        <p:nvSpPr>
+          <p:cNvPr id="198" name="Google Shape;198;g14043b2a0cc_1_6"/>
+          <p:cNvSpPr txBox="1">
+            <a:spLocks noGrp="1"/>
+          </p:cNvSpPr>
+          <p:nvPr>
+            <p:ph type="title"/>
+          </p:nvPr>
+        </p:nvSpPr>
+        <p:spPr>
+          <a:xfrm>
+            <a:off x="311700" y="445025"/>
+            <a:ext cx="8520600" cy="572700"/>
+          </a:xfrm>
+          <a:prstGeom prst="rect">
+            <a:avLst/>
+          </a:prstGeom>
+        </p:spPr>
+        <p:txBody>
+          <a:bodyPr spcFirstLastPara="1" wrap="square" lIns="91425" tIns="91425" rIns="91425" bIns="91425" anchor="t" anchorCtr="0">
+            <a:normAutofit/>
+          </a:bodyPr>
+          <a:lstStyle/>
+          <a:p>
+            <a:pPr marL="0" lvl="0" indent="0" algn="l" rtl="0">
+              <a:spcBef>
+                <a:spcPts val="0"/>
+              </a:spcBef>
+              <a:spcAft>
+                <a:spcPts val="0"/>
+              </a:spcAft>
+              <a:buNone/>
+            </a:pPr>
+            <a:r>
+              <a:rPr lang="en" sz="2022" b="1">
+                <a:solidFill>
+                  <a:srgbClr val="1A1A1A"/>
+                </a:solidFill>
+              </a:rPr>
+              <a:t>Data Model</a:t>
+            </a:r>
+            <a:endParaRPr sz="2022" b="1">
+              <a:solidFill>
+                <a:srgbClr val="1A1A1A"/>
+              </a:solidFill>
+            </a:endParaRPr>
+          </a:p>
+          <a:p>
+            <a:pPr marL="0" lvl="0" indent="0" algn="l" rtl="0">
+              <a:spcBef>
+                <a:spcPts val="0"/>
+              </a:spcBef>
+              <a:spcAft>
+                <a:spcPts val="0"/>
+              </a:spcAft>
+              <a:buNone/>
+            </a:pPr>
+            <a:endParaRPr sz="1300" b="1">
+              <a:solidFill>
+                <a:srgbClr val="000000"/>
+              </a:solidFill>
+            </a:endParaRPr>
+          </a:p>
+          <a:p>
+            <a:pPr marL="0" lvl="0" indent="0" algn="l" rtl="0">
+              <a:lnSpc>
+                <a:spcPct val="115000"/>
+              </a:lnSpc>
+              <a:spcBef>
+                <a:spcPts val="0"/>
+              </a:spcBef>
+              <a:spcAft>
+                <a:spcPts val="0"/>
+              </a:spcAft>
+              <a:buNone/>
+            </a:pPr>
+            <a:endParaRPr sz="1300" b="1">
+              <a:solidFill>
+                <a:srgbClr val="000000"/>
+              </a:solidFill>
+            </a:endParaRPr>
+          </a:p>
+          <a:p>
+            <a:pPr marL="0" lvl="0" indent="0" algn="l" rtl="0">
+              <a:spcBef>
+                <a:spcPts val="0"/>
+              </a:spcBef>
+              <a:spcAft>
+                <a:spcPts val="0"/>
+              </a:spcAft>
+              <a:buNone/>
+            </a:pPr>
+            <a:endParaRPr sz="1500" b="1">
+              <a:solidFill>
+                <a:srgbClr val="000000"/>
+              </a:solidFill>
+            </a:endParaRPr>
+          </a:p>
+          <a:p>
+            <a:pPr marL="0" lvl="0" indent="0" algn="l" rtl="0">
+              <a:spcBef>
+                <a:spcPts val="0"/>
+              </a:spcBef>
+              <a:spcAft>
+                <a:spcPts val="0"/>
+              </a:spcAft>
+              <a:buNone/>
+            </a:pPr>
+            <a:endParaRPr sz="1800" b="1">
+              <a:solidFill>
+                <a:srgbClr val="000000"/>
+              </a:solidFill>
+            </a:endParaRPr>
+          </a:p>
+          <a:p>
+            <a:pPr marL="0" lvl="0" indent="0" algn="l" rtl="0">
+              <a:spcBef>
+                <a:spcPts val="0"/>
+              </a:spcBef>
+              <a:spcAft>
+                <a:spcPts val="0"/>
+              </a:spcAft>
+              <a:buNone/>
+            </a:pPr>
+            <a:endParaRPr sz="1400">
+              <a:solidFill>
+                <a:srgbClr val="000000"/>
+              </a:solidFill>
+            </a:endParaRPr>
+          </a:p>
+          <a:p>
+            <a:pPr marL="0" lvl="0" indent="0" algn="l" rtl="0">
+              <a:spcBef>
+                <a:spcPts val="0"/>
+              </a:spcBef>
+              <a:spcAft>
+                <a:spcPts val="0"/>
+              </a:spcAft>
+              <a:buNone/>
+            </a:pPr>
+            <a:endParaRPr/>
+          </a:p>
+        </p:txBody>
+      </p:sp>
+      <p:graphicFrame>
+        <p:nvGraphicFramePr>
+          <p:cNvPr id="199" name="Google Shape;199;g14043b2a0cc_1_6"/>
+          <p:cNvGraphicFramePr/>
+          <p:nvPr>
+            <p:extLst>
+              <p:ext uri="{D42A27DB-BD31-4B8C-83A1-F6EECF244321}">
+                <p14:modId xmlns:p14="http://schemas.microsoft.com/office/powerpoint/2010/main" val="2885066667"/>
+              </p:ext>
+            </p:extLst>
+          </p:nvPr>
+        </p:nvGraphicFramePr>
+        <p:xfrm>
+          <a:off x="745450" y="1068325"/>
+          <a:ext cx="7669425" cy="3550900"/>
+        </p:xfrm>
+        <a:graphic>
+          <a:graphicData uri="http://schemas.openxmlformats.org/drawingml/2006/table">
+            <a:tbl>
+              <a:tblPr>
+                <a:noFill/>
+                <a:tableStyleId>{8F86EA43-7901-4526-B2A5-81DCC85C319C}</a:tableStyleId>
+              </a:tblPr>
+              <a:tblGrid>
+                <a:gridCol w="2556475">
+                  <a:extLst>
+                    <a:ext uri="{9D8B030D-6E8A-4147-A177-3AD203B41FA5}">
+                      <a16:colId xmlns:a16="http://schemas.microsoft.com/office/drawing/2014/main" val="20000"/>
+                    </a:ext>
+                  </a:extLst>
+                </a:gridCol>
+                <a:gridCol w="2556475">
+                  <a:extLst>
+                    <a:ext uri="{9D8B030D-6E8A-4147-A177-3AD203B41FA5}">
+                      <a16:colId xmlns:a16="http://schemas.microsoft.com/office/drawing/2014/main" val="20001"/>
+                    </a:ext>
+                  </a:extLst>
+                </a:gridCol>
+                <a:gridCol w="2556475">
+                  <a:extLst>
+                    <a:ext uri="{9D8B030D-6E8A-4147-A177-3AD203B41FA5}">
+                      <a16:colId xmlns:a16="http://schemas.microsoft.com/office/drawing/2014/main" val="20002"/>
+                    </a:ext>
+                  </a:extLst>
+                </a:gridCol>
+              </a:tblGrid>
+              <a:tr h="3550900">
+                <a:tc>
+                  <a:txBody>
+                    <a:bodyPr/>
+                    <a:lstStyle/>
+                    <a:p>
+                      <a:pPr marL="0" lvl="0" indent="0" algn="l" rtl="0">
+                        <a:lnSpc>
+                          <a:spcPct val="115000"/>
+                        </a:lnSpc>
+                        <a:spcBef>
+                          <a:spcPts val="0"/>
+                        </a:spcBef>
+                        <a:spcAft>
+                          <a:spcPts val="0"/>
+                        </a:spcAft>
+                        <a:buClr>
+                          <a:schemeClr val="dk1"/>
+                        </a:buClr>
+                        <a:buSzPts val="1100"/>
+                        <a:buFont typeface="Arial"/>
+                        <a:buNone/>
+                      </a:pPr>
+                      <a:r>
+                        <a:rPr lang="en-US" sz="1200" dirty="0" smtClean="0">
+                          <a:solidFill>
+                            <a:schemeClr val="dk1"/>
+                          </a:solidFill>
+                        </a:rPr>
+                        <a:t>3-Chat feature:-</a:t>
+                      </a:r>
+                    </a:p>
+                    <a:p>
+                      <a:pPr marL="0" lvl="0" indent="0" algn="l" rtl="0">
+                        <a:lnSpc>
+                          <a:spcPct val="115000"/>
+                        </a:lnSpc>
+                        <a:spcBef>
+                          <a:spcPts val="0"/>
+                        </a:spcBef>
+                        <a:spcAft>
+                          <a:spcPts val="0"/>
+                        </a:spcAft>
+                        <a:buClr>
+                          <a:schemeClr val="dk1"/>
+                        </a:buClr>
+                        <a:buSzPts val="1100"/>
+                        <a:buFont typeface="Arial"/>
+                        <a:buNone/>
+                      </a:pPr>
+                      <a:r>
+                        <a:rPr lang="en-US" sz="1200" dirty="0" smtClean="0">
+                          <a:solidFill>
+                            <a:schemeClr val="dk1"/>
+                          </a:solidFill>
+                        </a:rPr>
+                        <a:t>Class Chat{</a:t>
+                      </a:r>
+                    </a:p>
+                    <a:p>
+                      <a:pPr marL="0" lvl="0" indent="0" algn="l" rtl="0">
+                        <a:lnSpc>
+                          <a:spcPct val="115000"/>
+                        </a:lnSpc>
+                        <a:spcBef>
+                          <a:spcPts val="0"/>
+                        </a:spcBef>
+                        <a:spcAft>
+                          <a:spcPts val="0"/>
+                        </a:spcAft>
+                        <a:buClr>
+                          <a:schemeClr val="dk1"/>
+                        </a:buClr>
+                        <a:buSzPts val="1100"/>
+                        <a:buFont typeface="Arial"/>
+                        <a:buNone/>
+                      </a:pPr>
+                      <a:r>
+                        <a:rPr lang="en-US" sz="1200" dirty="0" err="1" smtClean="0">
+                          <a:solidFill>
+                            <a:schemeClr val="dk1"/>
+                          </a:solidFill>
+                        </a:rPr>
+                        <a:t>chatId:int</a:t>
+                      </a:r>
+                      <a:r>
+                        <a:rPr lang="en-US" sz="1200" dirty="0" smtClean="0">
+                          <a:solidFill>
+                            <a:schemeClr val="dk1"/>
+                          </a:solidFill>
+                        </a:rPr>
+                        <a:t>,</a:t>
+                      </a:r>
+                    </a:p>
+                    <a:p>
+                      <a:pPr marL="0" lvl="0" indent="0" algn="l" rtl="0">
+                        <a:lnSpc>
+                          <a:spcPct val="115000"/>
+                        </a:lnSpc>
+                        <a:spcBef>
+                          <a:spcPts val="0"/>
+                        </a:spcBef>
+                        <a:spcAft>
+                          <a:spcPts val="0"/>
+                        </a:spcAft>
+                        <a:buClr>
+                          <a:schemeClr val="dk1"/>
+                        </a:buClr>
+                        <a:buSzPts val="1100"/>
+                        <a:buFont typeface="Arial"/>
+                        <a:buNone/>
+                      </a:pPr>
+                      <a:r>
+                        <a:rPr lang="en-US" sz="1200" dirty="0" smtClean="0">
+                          <a:solidFill>
+                            <a:schemeClr val="dk1"/>
+                          </a:solidFill>
+                        </a:rPr>
+                        <a:t>“</a:t>
+                      </a:r>
+                      <a:r>
+                        <a:rPr lang="en-US" sz="1200" dirty="0" err="1" smtClean="0">
+                          <a:solidFill>
+                            <a:schemeClr val="dk1"/>
+                          </a:solidFill>
+                        </a:rPr>
+                        <a:t>ownerEmail</a:t>
+                      </a:r>
+                      <a:r>
+                        <a:rPr lang="en-US" sz="1200" dirty="0" smtClean="0">
+                          <a:solidFill>
+                            <a:schemeClr val="dk1"/>
+                          </a:solidFill>
+                        </a:rPr>
+                        <a:t>”: String,</a:t>
+                      </a:r>
+                    </a:p>
+                    <a:p>
+                      <a:pPr marL="0" lvl="0" indent="0" algn="l" rtl="0">
+                        <a:lnSpc>
+                          <a:spcPct val="115000"/>
+                        </a:lnSpc>
+                        <a:spcBef>
+                          <a:spcPts val="0"/>
+                        </a:spcBef>
+                        <a:spcAft>
+                          <a:spcPts val="0"/>
+                        </a:spcAft>
+                        <a:buClr>
+                          <a:schemeClr val="dk1"/>
+                        </a:buClr>
+                        <a:buSzPts val="1100"/>
+                        <a:buFont typeface="Arial"/>
+                        <a:buNone/>
+                      </a:pPr>
+                      <a:r>
+                        <a:rPr lang="en-US" sz="1200" dirty="0" smtClean="0">
+                          <a:solidFill>
+                            <a:schemeClr val="dk1"/>
+                          </a:solidFill>
+                        </a:rPr>
+                        <a:t>“</a:t>
+                      </a:r>
+                      <a:r>
+                        <a:rPr lang="en-US" sz="1200" dirty="0" err="1" smtClean="0">
+                          <a:solidFill>
+                            <a:schemeClr val="dk1"/>
+                          </a:solidFill>
+                        </a:rPr>
+                        <a:t>buyerEmail</a:t>
+                      </a:r>
+                      <a:r>
+                        <a:rPr lang="en-US" sz="1200" dirty="0" smtClean="0">
+                          <a:solidFill>
+                            <a:schemeClr val="dk1"/>
+                          </a:solidFill>
+                        </a:rPr>
+                        <a:t>”:String,</a:t>
+                      </a:r>
+                    </a:p>
+                    <a:p>
+                      <a:pPr marL="0" lvl="0" indent="0" algn="l" rtl="0">
+                        <a:lnSpc>
+                          <a:spcPct val="115000"/>
+                        </a:lnSpc>
+                        <a:spcBef>
+                          <a:spcPts val="0"/>
+                        </a:spcBef>
+                        <a:spcAft>
+                          <a:spcPts val="0"/>
+                        </a:spcAft>
+                        <a:buClr>
+                          <a:schemeClr val="dk1"/>
+                        </a:buClr>
+                        <a:buSzPts val="1100"/>
+                        <a:buFont typeface="Arial"/>
+                        <a:buNone/>
+                      </a:pPr>
+                      <a:r>
+                        <a:rPr lang="en-US" sz="1200" dirty="0" smtClean="0">
+                          <a:solidFill>
+                            <a:schemeClr val="dk1"/>
+                          </a:solidFill>
+                        </a:rPr>
+                        <a:t>“List&lt;Message&gt;”{</a:t>
+                      </a:r>
+                    </a:p>
+                    <a:p>
+                      <a:pPr marL="0" lvl="0" indent="0" algn="l" rtl="0">
+                        <a:lnSpc>
+                          <a:spcPct val="115000"/>
+                        </a:lnSpc>
+                        <a:spcBef>
+                          <a:spcPts val="0"/>
+                        </a:spcBef>
+                        <a:spcAft>
+                          <a:spcPts val="0"/>
+                        </a:spcAft>
+                        <a:buClr>
+                          <a:schemeClr val="dk1"/>
+                        </a:buClr>
+                        <a:buSzPts val="1100"/>
+                        <a:buFont typeface="Arial"/>
+                        <a:buNone/>
+                      </a:pPr>
+                      <a:r>
+                        <a:rPr lang="en-US" sz="1200" dirty="0" smtClean="0">
+                          <a:solidFill>
+                            <a:schemeClr val="dk1"/>
+                          </a:solidFill>
+                        </a:rPr>
+                        <a:t>“</a:t>
+                      </a:r>
+                      <a:r>
+                        <a:rPr lang="en-US" sz="1200" dirty="0" err="1" smtClean="0">
+                          <a:solidFill>
+                            <a:schemeClr val="dk1"/>
+                          </a:solidFill>
+                        </a:rPr>
+                        <a:t>senderEmail</a:t>
+                      </a:r>
+                      <a:r>
+                        <a:rPr lang="en-US" sz="1200" dirty="0" smtClean="0">
+                          <a:solidFill>
+                            <a:schemeClr val="dk1"/>
+                          </a:solidFill>
+                        </a:rPr>
+                        <a:t>”:string,</a:t>
+                      </a:r>
+                    </a:p>
+                    <a:p>
+                      <a:pPr marL="0" lvl="0" indent="0" algn="l" rtl="0">
+                        <a:lnSpc>
+                          <a:spcPct val="115000"/>
+                        </a:lnSpc>
+                        <a:spcBef>
+                          <a:spcPts val="0"/>
+                        </a:spcBef>
+                        <a:spcAft>
+                          <a:spcPts val="0"/>
+                        </a:spcAft>
+                        <a:buClr>
+                          <a:schemeClr val="dk1"/>
+                        </a:buClr>
+                        <a:buSzPts val="1100"/>
+                        <a:buFont typeface="Arial"/>
+                        <a:buNone/>
+                      </a:pPr>
+                      <a:r>
+                        <a:rPr lang="en-US" sz="1200" dirty="0" smtClean="0">
+                          <a:solidFill>
+                            <a:schemeClr val="dk1"/>
+                          </a:solidFill>
+                        </a:rPr>
+                        <a:t>“</a:t>
+                      </a:r>
+                      <a:r>
+                        <a:rPr lang="en-US" sz="1200" dirty="0" err="1" smtClean="0">
+                          <a:solidFill>
+                            <a:schemeClr val="dk1"/>
+                          </a:solidFill>
+                        </a:rPr>
+                        <a:t>Time”:time</a:t>
+                      </a:r>
+                      <a:r>
+                        <a:rPr lang="en-US" sz="1200" dirty="0" smtClean="0">
+                          <a:solidFill>
+                            <a:schemeClr val="dk1"/>
+                          </a:solidFill>
+                        </a:rPr>
+                        <a:t>,</a:t>
+                      </a:r>
+                    </a:p>
+                    <a:p>
+                      <a:pPr marL="0" lvl="0" indent="0" algn="l" rtl="0">
+                        <a:lnSpc>
+                          <a:spcPct val="115000"/>
+                        </a:lnSpc>
+                        <a:spcBef>
+                          <a:spcPts val="0"/>
+                        </a:spcBef>
+                        <a:spcAft>
+                          <a:spcPts val="0"/>
+                        </a:spcAft>
+                        <a:buClr>
+                          <a:schemeClr val="dk1"/>
+                        </a:buClr>
+                        <a:buSzPts val="1100"/>
+                        <a:buFont typeface="Arial"/>
+                        <a:buNone/>
+                      </a:pPr>
+                      <a:r>
+                        <a:rPr lang="en-US" sz="1200" dirty="0" smtClean="0">
+                          <a:solidFill>
+                            <a:schemeClr val="dk1"/>
+                          </a:solidFill>
+                        </a:rPr>
+                        <a:t>“</a:t>
+                      </a:r>
+                      <a:r>
+                        <a:rPr lang="en-US" sz="1200" dirty="0" err="1" smtClean="0">
+                          <a:solidFill>
+                            <a:schemeClr val="dk1"/>
+                          </a:solidFill>
+                        </a:rPr>
+                        <a:t>replyMessage</a:t>
+                      </a:r>
+                      <a:r>
+                        <a:rPr lang="en-US" sz="1200" dirty="0" smtClean="0">
+                          <a:solidFill>
+                            <a:schemeClr val="dk1"/>
+                          </a:solidFill>
+                        </a:rPr>
+                        <a:t>”:string</a:t>
+                      </a:r>
+                    </a:p>
+                    <a:p>
+                      <a:pPr marL="0" lvl="0" indent="0" algn="l" rtl="0">
+                        <a:lnSpc>
+                          <a:spcPct val="115000"/>
+                        </a:lnSpc>
+                        <a:spcBef>
+                          <a:spcPts val="0"/>
+                        </a:spcBef>
+                        <a:spcAft>
+                          <a:spcPts val="0"/>
+                        </a:spcAft>
+                        <a:buClr>
+                          <a:schemeClr val="dk1"/>
+                        </a:buClr>
+                        <a:buSzPts val="1100"/>
+                        <a:buFont typeface="Arial"/>
+                        <a:buNone/>
+                      </a:pPr>
+                      <a:r>
+                        <a:rPr lang="en-US" sz="1200" dirty="0" smtClean="0">
+                          <a:solidFill>
+                            <a:schemeClr val="dk1"/>
+                          </a:solidFill>
+                        </a:rPr>
+                        <a:t>}</a:t>
+                      </a:r>
+                    </a:p>
+                    <a:p>
+                      <a:pPr marL="0" lvl="0" indent="0" algn="l" rtl="0">
+                        <a:spcBef>
+                          <a:spcPts val="0"/>
+                        </a:spcBef>
+                        <a:spcAft>
+                          <a:spcPts val="0"/>
+                        </a:spcAft>
+                        <a:buNone/>
+                      </a:pPr>
+                      <a:endParaRPr dirty="0"/>
+                    </a:p>
+                  </a:txBody>
+                  <a:tcPr marL="91425" marR="91425" marT="91425" marB="91425"/>
+                </a:tc>
+                <a:tc>
+                  <a:txBody>
+                    <a:bodyPr/>
+                    <a:lstStyle/>
+                    <a:p>
+                      <a:pPr marL="0" lvl="0" indent="0" algn="l" rtl="0">
+                        <a:spcBef>
+                          <a:spcPts val="0"/>
+                        </a:spcBef>
+                        <a:spcAft>
+                          <a:spcPts val="0"/>
+                        </a:spcAft>
+                        <a:buNone/>
+                      </a:pPr>
+                      <a:r>
+                        <a:rPr lang="en" sz="1300">
+                          <a:solidFill>
+                            <a:schemeClr val="dk1"/>
+                          </a:solidFill>
+                        </a:rPr>
+                        <a:t>6-Recommendation:-</a:t>
+                      </a:r>
+                      <a:endParaRPr sz="1300">
+                        <a:solidFill>
+                          <a:schemeClr val="dk1"/>
+                        </a:solidFill>
+                      </a:endParaRPr>
+                    </a:p>
+                    <a:p>
+                      <a:pPr marL="0" lvl="0" indent="0" algn="l" rtl="0">
+                        <a:spcBef>
+                          <a:spcPts val="0"/>
+                        </a:spcBef>
+                        <a:spcAft>
+                          <a:spcPts val="0"/>
+                        </a:spcAft>
+                        <a:buNone/>
+                      </a:pPr>
+                      <a:r>
+                        <a:rPr lang="en" sz="1300">
+                          <a:solidFill>
+                            <a:schemeClr val="dk1"/>
+                          </a:solidFill>
+                        </a:rPr>
+                        <a:t>Class recommendation{</a:t>
+                      </a:r>
+                      <a:endParaRPr sz="1300">
+                        <a:solidFill>
+                          <a:schemeClr val="dk1"/>
+                        </a:solidFill>
+                      </a:endParaRPr>
+                    </a:p>
+                    <a:p>
+                      <a:pPr marL="0" lvl="0" indent="0" algn="l" rtl="0">
+                        <a:spcBef>
+                          <a:spcPts val="0"/>
+                        </a:spcBef>
+                        <a:spcAft>
+                          <a:spcPts val="0"/>
+                        </a:spcAft>
+                        <a:buNone/>
+                      </a:pPr>
+                      <a:r>
+                        <a:rPr lang="en" sz="1300">
+                          <a:solidFill>
+                            <a:schemeClr val="dk1"/>
+                          </a:solidFill>
+                        </a:rPr>
+                        <a:t>“Product Id”:int,</a:t>
+                      </a:r>
+                      <a:endParaRPr sz="1300">
+                        <a:solidFill>
+                          <a:schemeClr val="dk1"/>
+                        </a:solidFill>
+                      </a:endParaRPr>
+                    </a:p>
+                    <a:p>
+                      <a:pPr marL="0" lvl="0" indent="0" algn="l" rtl="0">
+                        <a:spcBef>
+                          <a:spcPts val="0"/>
+                        </a:spcBef>
+                        <a:spcAft>
+                          <a:spcPts val="0"/>
+                        </a:spcAft>
+                        <a:buNone/>
+                      </a:pPr>
+                      <a:r>
+                        <a:rPr lang="en" sz="1300">
+                          <a:solidFill>
+                            <a:schemeClr val="dk1"/>
+                          </a:solidFill>
+                        </a:rPr>
+                        <a:t>“</a:t>
+                      </a:r>
+                      <a:r>
+                        <a:rPr lang="en" sz="1200">
+                          <a:solidFill>
+                            <a:schemeClr val="dk1"/>
+                          </a:solidFill>
+                        </a:rPr>
+                        <a:t>Product owner </a:t>
+                      </a:r>
+                      <a:r>
+                        <a:rPr lang="en" sz="1300">
+                          <a:solidFill>
+                            <a:schemeClr val="dk1"/>
+                          </a:solidFill>
+                        </a:rPr>
+                        <a:t>Email”:string,</a:t>
+                      </a:r>
+                      <a:endParaRPr sz="1300">
+                        <a:solidFill>
+                          <a:schemeClr val="dk1"/>
+                        </a:solidFill>
+                      </a:endParaRPr>
+                    </a:p>
+                    <a:p>
+                      <a:pPr marL="0" lvl="0" indent="0" algn="l" rtl="0">
+                        <a:spcBef>
+                          <a:spcPts val="0"/>
+                        </a:spcBef>
+                        <a:spcAft>
+                          <a:spcPts val="0"/>
+                        </a:spcAft>
+                        <a:buNone/>
+                      </a:pPr>
+                      <a:r>
+                        <a:rPr lang="en" sz="1300">
+                          <a:solidFill>
+                            <a:schemeClr val="dk1"/>
+                          </a:solidFill>
+                        </a:rPr>
+                        <a:t>“city”:string,</a:t>
+                      </a:r>
+                      <a:endParaRPr sz="1300">
+                        <a:solidFill>
+                          <a:schemeClr val="dk1"/>
+                        </a:solidFill>
+                      </a:endParaRPr>
+                    </a:p>
+                    <a:p>
+                      <a:pPr marL="0" lvl="0" indent="0" algn="l" rtl="0">
+                        <a:spcBef>
+                          <a:spcPts val="0"/>
+                        </a:spcBef>
+                        <a:spcAft>
+                          <a:spcPts val="0"/>
+                        </a:spcAft>
+                        <a:buNone/>
+                      </a:pPr>
+                      <a:r>
+                        <a:rPr lang="en" sz="1300">
+                          <a:solidFill>
+                            <a:schemeClr val="dk1"/>
+                          </a:solidFill>
+                        </a:rPr>
+                        <a:t>“State”:string,</a:t>
+                      </a:r>
+                      <a:endParaRPr sz="1300">
+                        <a:solidFill>
+                          <a:schemeClr val="dk1"/>
+                        </a:solidFill>
+                      </a:endParaRPr>
+                    </a:p>
+                    <a:p>
+                      <a:pPr marL="0" lvl="0" indent="0" algn="l" rtl="0">
+                        <a:spcBef>
+                          <a:spcPts val="0"/>
+                        </a:spcBef>
+                        <a:spcAft>
+                          <a:spcPts val="0"/>
+                        </a:spcAft>
+                        <a:buNone/>
+                      </a:pPr>
+                      <a:r>
+                        <a:rPr lang="en" sz="1300">
+                          <a:solidFill>
+                            <a:schemeClr val="dk1"/>
+                          </a:solidFill>
+                        </a:rPr>
+                        <a:t>“Product Category”:string,</a:t>
+                      </a:r>
+                      <a:endParaRPr sz="1300">
+                        <a:solidFill>
+                          <a:schemeClr val="dk1"/>
+                        </a:solidFill>
+                      </a:endParaRPr>
+                    </a:p>
+                    <a:p>
+                      <a:pPr marL="0" lvl="0" indent="0" algn="l" rtl="0">
+                        <a:lnSpc>
+                          <a:spcPct val="115000"/>
+                        </a:lnSpc>
+                        <a:spcBef>
+                          <a:spcPts val="0"/>
+                        </a:spcBef>
+                        <a:spcAft>
+                          <a:spcPts val="0"/>
+                        </a:spcAft>
+                        <a:buNone/>
+                      </a:pPr>
+                      <a:r>
+                        <a:rPr lang="en" sz="1300">
+                          <a:solidFill>
+                            <a:schemeClr val="dk1"/>
+                          </a:solidFill>
+                        </a:rPr>
+                        <a:t>“Mobile No.”:Longint,</a:t>
+                      </a:r>
+                      <a:endParaRPr sz="1300">
+                        <a:solidFill>
+                          <a:schemeClr val="dk1"/>
+                        </a:solidFill>
+                      </a:endParaRPr>
+                    </a:p>
+                    <a:p>
+                      <a:pPr marL="0" lvl="0" indent="0" algn="l" rtl="0">
+                        <a:spcBef>
+                          <a:spcPts val="0"/>
+                        </a:spcBef>
+                        <a:spcAft>
+                          <a:spcPts val="0"/>
+                        </a:spcAft>
+                        <a:buNone/>
+                      </a:pPr>
+                      <a:r>
+                        <a:rPr lang="en" sz="1300">
+                          <a:solidFill>
+                            <a:schemeClr val="dk1"/>
+                          </a:solidFill>
+                        </a:rPr>
+                        <a:t>“Product name”:String,</a:t>
+                      </a:r>
+                      <a:endParaRPr sz="1300">
+                        <a:solidFill>
+                          <a:schemeClr val="dk1"/>
+                        </a:solidFill>
+                      </a:endParaRPr>
+                    </a:p>
+                    <a:p>
+                      <a:pPr marL="0" lvl="0" indent="0" algn="l" rtl="0">
+                        <a:spcBef>
+                          <a:spcPts val="0"/>
+                        </a:spcBef>
+                        <a:spcAft>
+                          <a:spcPts val="0"/>
+                        </a:spcAft>
+                        <a:buNone/>
+                      </a:pPr>
+                      <a:r>
+                        <a:rPr lang="en" sz="1300">
+                          <a:solidFill>
+                            <a:srgbClr val="1A1A1A"/>
+                          </a:solidFill>
+                        </a:rPr>
+                        <a:t>“Product image”:byte</a:t>
+                      </a:r>
+                      <a:endParaRPr sz="1300">
+                        <a:solidFill>
+                          <a:srgbClr val="1A1A1A"/>
+                        </a:solidFill>
+                      </a:endParaRPr>
+                    </a:p>
+                    <a:p>
+                      <a:pPr marL="0" lvl="0" indent="0" algn="l" rtl="0">
+                        <a:spcBef>
+                          <a:spcPts val="0"/>
+                        </a:spcBef>
+                        <a:spcAft>
+                          <a:spcPts val="0"/>
+                        </a:spcAft>
+                        <a:buNone/>
+                      </a:pPr>
+                      <a:r>
+                        <a:rPr lang="en" sz="1300">
+                          <a:solidFill>
+                            <a:schemeClr val="dk1"/>
+                          </a:solidFill>
+                        </a:rPr>
+                        <a:t>}</a:t>
+                      </a:r>
+                      <a:endParaRPr/>
+                    </a:p>
+                  </a:txBody>
+                  <a:tcPr marL="91425" marR="91425" marT="91425" marB="91425"/>
+                </a:tc>
+                <a:tc>
+                  <a:txBody>
+                    <a:bodyPr/>
+                    <a:lstStyle/>
+                    <a:p>
+                      <a:pPr marL="0" lvl="0" indent="0" algn="l" rtl="0">
+                        <a:spcBef>
+                          <a:spcPts val="0"/>
+                        </a:spcBef>
+                        <a:spcAft>
+                          <a:spcPts val="0"/>
+                        </a:spcAft>
+                        <a:buNone/>
+                      </a:pPr>
+                      <a:r>
+                        <a:rPr lang="en" sz="1300" dirty="0">
+                          <a:solidFill>
+                            <a:schemeClr val="dk1"/>
+                          </a:solidFill>
+                        </a:rPr>
+                        <a:t>7-Email Notification service :-</a:t>
+                      </a:r>
+                      <a:endParaRPr sz="1300" dirty="0">
+                        <a:solidFill>
+                          <a:schemeClr val="dk1"/>
+                        </a:solidFill>
+                      </a:endParaRPr>
+                    </a:p>
+                    <a:p>
+                      <a:pPr marL="0" lvl="0" indent="0" algn="l" rtl="0">
+                        <a:spcBef>
+                          <a:spcPts val="0"/>
+                        </a:spcBef>
+                        <a:spcAft>
+                          <a:spcPts val="0"/>
+                        </a:spcAft>
+                        <a:buNone/>
+                      </a:pPr>
+                      <a:r>
+                        <a:rPr lang="en" sz="1300" dirty="0">
+                          <a:solidFill>
+                            <a:schemeClr val="dk1"/>
+                          </a:solidFill>
+                        </a:rPr>
+                        <a:t>Class Notification{</a:t>
+                      </a:r>
+                      <a:endParaRPr sz="1300" dirty="0">
+                        <a:solidFill>
+                          <a:schemeClr val="dk1"/>
+                        </a:solidFill>
+                      </a:endParaRPr>
+                    </a:p>
+                    <a:p>
+                      <a:pPr marL="0" lvl="0" indent="0" algn="l" rtl="0">
+                        <a:lnSpc>
+                          <a:spcPct val="115000"/>
+                        </a:lnSpc>
+                        <a:spcBef>
+                          <a:spcPts val="0"/>
+                        </a:spcBef>
+                        <a:spcAft>
+                          <a:spcPts val="0"/>
+                        </a:spcAft>
+                        <a:buNone/>
+                      </a:pPr>
+                      <a:r>
+                        <a:rPr lang="en" sz="1200" dirty="0">
+                          <a:solidFill>
+                            <a:schemeClr val="dk1"/>
+                          </a:solidFill>
+                        </a:rPr>
+                        <a:t>“emailBuyer”: String,</a:t>
+                      </a:r>
+                      <a:endParaRPr sz="1200" dirty="0">
+                        <a:solidFill>
+                          <a:schemeClr val="dk1"/>
+                        </a:solidFill>
+                      </a:endParaRPr>
+                    </a:p>
+                    <a:p>
+                      <a:pPr marL="0" lvl="0" indent="0" algn="l" rtl="0">
+                        <a:lnSpc>
+                          <a:spcPct val="115000"/>
+                        </a:lnSpc>
+                        <a:spcBef>
+                          <a:spcPts val="0"/>
+                        </a:spcBef>
+                        <a:spcAft>
+                          <a:spcPts val="0"/>
+                        </a:spcAft>
+                        <a:buNone/>
+                      </a:pPr>
+                      <a:r>
+                        <a:rPr lang="en" sz="1200" dirty="0">
+                          <a:solidFill>
+                            <a:schemeClr val="dk1"/>
+                          </a:solidFill>
+                        </a:rPr>
+                        <a:t>“Email Seller”: String,</a:t>
+                      </a:r>
+                      <a:endParaRPr sz="1200" dirty="0">
+                        <a:solidFill>
+                          <a:schemeClr val="dk1"/>
+                        </a:solidFill>
+                      </a:endParaRPr>
+                    </a:p>
+                    <a:p>
+                      <a:pPr marL="0" lvl="0" indent="0" algn="l" rtl="0">
+                        <a:lnSpc>
+                          <a:spcPct val="115000"/>
+                        </a:lnSpc>
+                        <a:spcBef>
+                          <a:spcPts val="0"/>
+                        </a:spcBef>
+                        <a:spcAft>
+                          <a:spcPts val="0"/>
+                        </a:spcAft>
+                        <a:buNone/>
+                      </a:pPr>
+                      <a:endParaRPr sz="1200" dirty="0">
+                        <a:solidFill>
+                          <a:schemeClr val="dk1"/>
+                        </a:solidFill>
+                      </a:endParaRPr>
+                    </a:p>
+                    <a:p>
+                      <a:pPr marL="0" lvl="0" indent="0" algn="l" rtl="0">
+                        <a:spcBef>
+                          <a:spcPts val="0"/>
+                        </a:spcBef>
+                        <a:spcAft>
+                          <a:spcPts val="0"/>
+                        </a:spcAft>
+                        <a:buNone/>
+                      </a:pPr>
+                      <a:r>
+                        <a:rPr lang="en" sz="1300" dirty="0">
+                          <a:solidFill>
+                            <a:schemeClr val="dk1"/>
+                          </a:solidFill>
+                        </a:rPr>
+                        <a:t>“Product Id”:int,</a:t>
+                      </a:r>
+                      <a:endParaRPr sz="1300" dirty="0">
+                        <a:solidFill>
+                          <a:schemeClr val="dk1"/>
+                        </a:solidFill>
+                      </a:endParaRPr>
+                    </a:p>
+                    <a:p>
+                      <a:pPr marL="0" lvl="0" indent="0" algn="l" rtl="0">
+                        <a:spcBef>
+                          <a:spcPts val="0"/>
+                        </a:spcBef>
+                        <a:spcAft>
+                          <a:spcPts val="0"/>
+                        </a:spcAft>
+                        <a:buNone/>
+                      </a:pPr>
+                      <a:r>
+                        <a:rPr lang="en" sz="1300" dirty="0">
+                          <a:solidFill>
+                            <a:schemeClr val="dk1"/>
+                          </a:solidFill>
+                        </a:rPr>
+                        <a:t>“Product name”:String,</a:t>
+                      </a:r>
+                      <a:endParaRPr sz="1300" dirty="0">
+                        <a:solidFill>
+                          <a:schemeClr val="dk1"/>
+                        </a:solidFill>
+                      </a:endParaRPr>
+                    </a:p>
+                    <a:p>
+                      <a:pPr marL="0" lvl="0" indent="0" algn="l" rtl="0">
+                        <a:lnSpc>
+                          <a:spcPct val="115000"/>
+                        </a:lnSpc>
+                        <a:spcBef>
+                          <a:spcPts val="0"/>
+                        </a:spcBef>
+                        <a:spcAft>
+                          <a:spcPts val="0"/>
+                        </a:spcAft>
+                        <a:buNone/>
+                      </a:pPr>
+                      <a:r>
+                        <a:rPr lang="en" sz="1300" dirty="0">
+                          <a:solidFill>
+                            <a:schemeClr val="dk1"/>
+                          </a:solidFill>
+                        </a:rPr>
+                        <a:t>“Transaction Number”: Longint,</a:t>
+                      </a:r>
+                      <a:endParaRPr sz="1300" dirty="0">
+                        <a:solidFill>
+                          <a:schemeClr val="dk1"/>
+                        </a:solidFill>
+                      </a:endParaRPr>
+                    </a:p>
+                    <a:p>
+                      <a:pPr marL="0" lvl="0" indent="0" algn="l" rtl="0">
+                        <a:lnSpc>
+                          <a:spcPct val="115000"/>
+                        </a:lnSpc>
+                        <a:spcBef>
+                          <a:spcPts val="0"/>
+                        </a:spcBef>
+                        <a:spcAft>
+                          <a:spcPts val="0"/>
+                        </a:spcAft>
+                        <a:buNone/>
+                      </a:pPr>
+                      <a:r>
+                        <a:rPr lang="en" sz="1300" dirty="0">
+                          <a:solidFill>
+                            <a:schemeClr val="dk1"/>
+                          </a:solidFill>
+                        </a:rPr>
+                        <a:t>“Date of Transaction”:Date,</a:t>
+                      </a:r>
+                      <a:endParaRPr sz="1300" dirty="0">
+                        <a:solidFill>
+                          <a:schemeClr val="dk1"/>
+                        </a:solidFill>
+                      </a:endParaRPr>
+                    </a:p>
+                    <a:p>
+                      <a:pPr marL="0" lvl="0" indent="0" algn="l" rtl="0">
+                        <a:lnSpc>
+                          <a:spcPct val="115000"/>
+                        </a:lnSpc>
+                        <a:spcBef>
+                          <a:spcPts val="0"/>
+                        </a:spcBef>
+                        <a:spcAft>
+                          <a:spcPts val="0"/>
+                        </a:spcAft>
+                        <a:buNone/>
+                      </a:pPr>
+                      <a:r>
+                        <a:rPr lang="en" sz="1300" dirty="0">
+                          <a:solidFill>
+                            <a:schemeClr val="dk1"/>
+                          </a:solidFill>
+                        </a:rPr>
+                        <a:t>“Transaction Method”:String</a:t>
+                      </a:r>
+                      <a:endParaRPr sz="1300" dirty="0">
+                        <a:solidFill>
+                          <a:schemeClr val="dk1"/>
+                        </a:solidFill>
+                      </a:endParaRPr>
+                    </a:p>
+                    <a:p>
+                      <a:pPr marL="0" lvl="0" indent="0" algn="l" rtl="0">
+                        <a:spcBef>
+                          <a:spcPts val="0"/>
+                        </a:spcBef>
+                        <a:spcAft>
+                          <a:spcPts val="0"/>
+                        </a:spcAft>
+                        <a:buNone/>
+                      </a:pPr>
+                      <a:r>
+                        <a:rPr lang="en" sz="1300" dirty="0">
+                          <a:solidFill>
+                            <a:schemeClr val="dk1"/>
+                          </a:solidFill>
+                        </a:rPr>
+                        <a:t>}</a:t>
+                      </a:r>
+                      <a:endParaRPr sz="1300" dirty="0">
+                        <a:solidFill>
+                          <a:schemeClr val="dk1"/>
+                        </a:solidFill>
+                      </a:endParaRPr>
+                    </a:p>
+                  </a:txBody>
+                  <a:tcPr marL="91425" marR="91425" marT="91425" marB="91425"/>
+                </a:tc>
+                <a:extLst>
+                  <a:ext uri="{0D108BD9-81ED-4DB2-BD59-A6C34878D82A}">
+                    <a16:rowId xmlns:a16="http://schemas.microsoft.com/office/drawing/2014/main" val="10000"/>
+                  </a:ext>
+                </a:extLst>
+              </a:tr>
+            </a:tbl>
+          </a:graphicData>
+        </a:graphic>
+      </p:graphicFrame>
+    </p:spTree>
+    <p:extLst>
+      <p:ext uri="{BB962C8B-B14F-4D97-AF65-F5344CB8AC3E}">
+        <p14:creationId xmlns:p14="http://schemas.microsoft.com/office/powerpoint/2010/main" val="911710903"/>
+      </p:ext>
+    </p:extLst>
+  </p:cSld>
+  <p:clrMapOvr>
+    <a:masterClrMapping/>
+  </p:clrMapOvr>
+</p:sld>
+</file>
+
+<file path=ppt/slides/slide24.xml><?xml version="1.0" encoding="utf-8"?>
+<p:sld xmlns:a="http://schemas.openxmlformats.org/drawingml/2006/main" xmlns:r="http://schemas.openxmlformats.org/officeDocument/2006/relationships" xmlns:p="http://schemas.openxmlformats.org/presentationml/2006/main">
+  <p:cSld>
+    <p:spTree>
+      <p:nvGrpSpPr>
         <p:cNvPr id="1" name="Shape 203"/>
         <p:cNvGrpSpPr/>
         <p:nvPr/>
@@ -20937,7 +22748,7 @@
 </p:sld>
 </file>
 
-<file path=ppt/slides/slide24.xml><?xml version="1.0" encoding="utf-8"?>
+<file path=ppt/slides/slide25.xml><?xml version="1.0" encoding="utf-8"?>
 <p:sld xmlns:a="http://schemas.openxmlformats.org/drawingml/2006/main" xmlns:r="http://schemas.openxmlformats.org/officeDocument/2006/relationships" xmlns:p="http://schemas.openxmlformats.org/presentationml/2006/main">
   <p:cSld>
     <p:bg>
@@ -21379,11 +23190,11 @@
   <p:clrMapOvr>
     <a:masterClrMapping/>
   </p:clrMapOvr>
-  <mc:AlternateContent xmlns:mc="http://schemas.openxmlformats.org/markup-compatibility/2006">
-    <mc:Choice xmlns:p14="http://schemas.microsoft.com/office/powerpoint/2010/main" Requires="p14">
+  <mc:AlternateContent xmlns:mc="http://schemas.openxmlformats.org/markup-compatibility/2006" xmlns:p14="http://schemas.microsoft.com/office/powerpoint/2010/main">
+    <mc:Choice Requires="p14">
       <p:transition spd="slow" p14:dur="2000"/>
     </mc:Choice>
-    <mc:Fallback>
+    <mc:Fallback xmlns="">
       <p:transition spd="slow"/>
     </mc:Fallback>
   </mc:AlternateContent>

</xml_diff>